<commit_message>
Update NNDL - Fall 18 Week 1 - Administration and basics.pptx
</commit_message>
<xml_diff>
--- a/NNDL - Fall 18 Week 1 - Administration and basics.pptx
+++ b/NNDL - Fall 18 Week 1 - Administration and basics.pptx
@@ -12369,30 +12369,82 @@
           <a:lstStyle/>
           <a:p>
             <a:r>
-              <a:rPr lang="de-CH" sz="2000"/>
+              <a:rPr lang="de-CH" sz="2000" dirty="0"/>
               <a:t>Every </a:t>
             </a:r>
             <a:r>
-              <a:rPr lang="de-CH" sz="2000" b="1"/>
+              <a:rPr lang="de-CH" sz="2000" b="1" dirty="0"/>
               <a:t>Tuesday 17:15-20:00 </a:t>
             </a:r>
             <a:r>
-              <a:rPr lang="de-CH" sz="2000"/>
-              <a:t>– Please arrive at </a:t>
-            </a:r>
-            <a:r>
-              <a:rPr lang="de-CH" sz="2000" b="1"/>
+              <a:rPr lang="de-CH" sz="2000" dirty="0"/>
+              <a:t>– </a:t>
+            </a:r>
+            <a:r>
+              <a:rPr lang="de-CH" sz="2000" dirty="0" err="1"/>
+              <a:t>Please</a:t>
+            </a:r>
+            <a:r>
+              <a:rPr lang="de-CH" sz="2000" dirty="0"/>
+              <a:t> </a:t>
+            </a:r>
+            <a:r>
+              <a:rPr lang="de-CH" sz="2000" dirty="0" err="1"/>
+              <a:t>arrive</a:t>
+            </a:r>
+            <a:r>
+              <a:rPr lang="de-CH" sz="2000" dirty="0"/>
+              <a:t> at </a:t>
+            </a:r>
+            <a:r>
+              <a:rPr lang="de-CH" sz="2000" b="1" dirty="0"/>
               <a:t>17:00</a:t>
             </a:r>
             <a:r>
-              <a:rPr lang="de-CH" sz="2000"/>
-              <a:t> so that we can start on time</a:t>
+              <a:rPr lang="de-CH" sz="2000" dirty="0"/>
+              <a:t> so that </a:t>
+            </a:r>
+            <a:r>
+              <a:rPr lang="de-CH" sz="2000" dirty="0" err="1"/>
+              <a:t>we</a:t>
+            </a:r>
+            <a:r>
+              <a:rPr lang="de-CH" sz="2000" dirty="0"/>
+              <a:t> </a:t>
+            </a:r>
+            <a:r>
+              <a:rPr lang="de-CH" sz="2000" dirty="0" err="1"/>
+              <a:t>can</a:t>
+            </a:r>
+            <a:r>
+              <a:rPr lang="de-CH" sz="2000" dirty="0"/>
+              <a:t> </a:t>
+            </a:r>
+            <a:r>
+              <a:rPr lang="de-CH" sz="2000" dirty="0" err="1"/>
+              <a:t>start</a:t>
+            </a:r>
+            <a:r>
+              <a:rPr lang="de-CH" sz="2000" dirty="0"/>
+              <a:t> on time</a:t>
             </a:r>
           </a:p>
           <a:p>
             <a:r>
-              <a:rPr lang="de-CH" sz="2000"/>
-              <a:t>Exact dates: </a:t>
+              <a:rPr lang="de-CH" sz="2000" dirty="0" err="1"/>
+              <a:t>Exact</a:t>
+            </a:r>
+            <a:r>
+              <a:rPr lang="de-CH" sz="2000" dirty="0"/>
+              <a:t> </a:t>
+            </a:r>
+            <a:r>
+              <a:rPr lang="de-CH" sz="2000" dirty="0" err="1"/>
+              <a:t>dates</a:t>
+            </a:r>
+            <a:r>
+              <a:rPr lang="de-CH" sz="2000" dirty="0"/>
+              <a:t>: </a:t>
             </a:r>
           </a:p>
           <a:p>
@@ -12401,7 +12453,7 @@
             </a:pPr>
             <a:r>
               <a:rPr lang="en-GB" sz="2000"/>
-              <a:t>3.10 – Preparation course: Python and numpy</a:t>
+              <a:t>23.10 – Preparation course: Python and numpy</a:t>
             </a:r>
             <a:br>
               <a:rPr lang="en-GB" sz="2000"/>
@@ -12487,7 +12539,7 @@
               <a:rPr lang="en-GB" sz="2000"/>
               <a:t>5.2 (End Project)</a:t>
             </a:r>
-            <a:endParaRPr lang="en-CH" sz="2000"/>
+            <a:endParaRPr lang="en-CH" sz="2000" dirty="0"/>
           </a:p>
         </p:txBody>
       </p:sp>

</xml_diff>